<commit_message>
Adding Hymn PowerPoint files
Add Hymn PowerPoint files into Repo for centralized management
</commit_message>
<xml_diff>
--- a/CANTONESE/binaries/H086.pptx
+++ b/CANTONESE/binaries/H086.pptx
@@ -106,6 +106,22 @@
       </a:defRPr>
     </a:lvl9pPr>
   </p:defaultTextStyle>
+  <p:extLst>
+    <p:ext uri="{EFAFB233-063F-42B5-8137-9DF3F51BA10A}">
+      <p15:sldGuideLst xmlns:p15="http://schemas.microsoft.com/office/powerpoint/2012/main">
+        <p15:guide id="1" orient="horz" pos="2160">
+          <p15:clr>
+            <a:srgbClr val="A4A3A4"/>
+          </p15:clr>
+        </p15:guide>
+        <p15:guide id="2" pos="2880">
+          <p15:clr>
+            <a:srgbClr val="A4A3A4"/>
+          </p15:clr>
+        </p15:guide>
+      </p15:sldGuideLst>
+    </p:ext>
+  </p:extLst>
 </p:presentation>
 </file>
 
@@ -147,10 +163,9 @@
           <a:lstStyle/>
           <a:p>
             <a:r>
-              <a:rPr lang="en-US" smtClean="0"/>
+              <a:rPr lang="en-US"/>
               <a:t>Click to edit Master title style</a:t>
             </a:r>
-            <a:endParaRPr lang="en-US"/>
           </a:p>
         </p:txBody>
       </p:sp>
@@ -266,10 +281,9 @@
           </a:lstStyle>
           <a:p>
             <a:r>
-              <a:rPr lang="en-US" smtClean="0"/>
+              <a:rPr lang="en-US"/>
               <a:t>Click to edit Master subtitle style</a:t>
             </a:r>
-            <a:endParaRPr lang="en-US"/>
           </a:p>
         </p:txBody>
       </p:sp>
@@ -290,7 +304,7 @@
           <a:p>
             <a:fld id="{C6E2A84D-9853-4072-BA3E-F55C1F0C3937}" type="datetimeFigureOut">
               <a:rPr lang="en-US" smtClean="0"/>
-              <a:t>1/19/2014</a:t>
+              <a:t>4/23/2023</a:t>
             </a:fld>
             <a:endParaRPr lang="en-US"/>
           </a:p>
@@ -379,10 +393,9 @@
           <a:lstStyle/>
           <a:p>
             <a:r>
-              <a:rPr lang="en-US" smtClean="0"/>
+              <a:rPr lang="en-US"/>
               <a:t>Click to edit Master title style</a:t>
             </a:r>
-            <a:endParaRPr lang="en-US"/>
           </a:p>
         </p:txBody>
       </p:sp>
@@ -403,38 +416,37 @@
           <a:p>
             <a:pPr lvl="0"/>
             <a:r>
-              <a:rPr lang="en-US" smtClean="0"/>
+              <a:rPr lang="en-US"/>
               <a:t>Click to edit Master text styles</a:t>
             </a:r>
           </a:p>
           <a:p>
             <a:pPr lvl="1"/>
             <a:r>
-              <a:rPr lang="en-US" smtClean="0"/>
+              <a:rPr lang="en-US"/>
               <a:t>Second level</a:t>
             </a:r>
           </a:p>
           <a:p>
             <a:pPr lvl="2"/>
             <a:r>
-              <a:rPr lang="en-US" smtClean="0"/>
+              <a:rPr lang="en-US"/>
               <a:t>Third level</a:t>
             </a:r>
           </a:p>
           <a:p>
             <a:pPr lvl="3"/>
             <a:r>
-              <a:rPr lang="en-US" smtClean="0"/>
+              <a:rPr lang="en-US"/>
               <a:t>Fourth level</a:t>
             </a:r>
           </a:p>
           <a:p>
             <a:pPr lvl="4"/>
             <a:r>
-              <a:rPr lang="en-US" smtClean="0"/>
+              <a:rPr lang="en-US"/>
               <a:t>Fifth level</a:t>
             </a:r>
-            <a:endParaRPr lang="en-US"/>
           </a:p>
         </p:txBody>
       </p:sp>
@@ -455,7 +467,7 @@
           <a:p>
             <a:fld id="{C6E2A84D-9853-4072-BA3E-F55C1F0C3937}" type="datetimeFigureOut">
               <a:rPr lang="en-US" smtClean="0"/>
-              <a:t>1/19/2014</a:t>
+              <a:t>4/23/2023</a:t>
             </a:fld>
             <a:endParaRPr lang="en-US"/>
           </a:p>
@@ -549,10 +561,9 @@
           <a:lstStyle/>
           <a:p>
             <a:r>
-              <a:rPr lang="en-US" smtClean="0"/>
+              <a:rPr lang="en-US"/>
               <a:t>Click to edit Master title style</a:t>
             </a:r>
-            <a:endParaRPr lang="en-US"/>
           </a:p>
         </p:txBody>
       </p:sp>
@@ -578,38 +589,37 @@
           <a:p>
             <a:pPr lvl="0"/>
             <a:r>
-              <a:rPr lang="en-US" smtClean="0"/>
+              <a:rPr lang="en-US"/>
               <a:t>Click to edit Master text styles</a:t>
             </a:r>
           </a:p>
           <a:p>
             <a:pPr lvl="1"/>
             <a:r>
-              <a:rPr lang="en-US" smtClean="0"/>
+              <a:rPr lang="en-US"/>
               <a:t>Second level</a:t>
             </a:r>
           </a:p>
           <a:p>
             <a:pPr lvl="2"/>
             <a:r>
-              <a:rPr lang="en-US" smtClean="0"/>
+              <a:rPr lang="en-US"/>
               <a:t>Third level</a:t>
             </a:r>
           </a:p>
           <a:p>
             <a:pPr lvl="3"/>
             <a:r>
-              <a:rPr lang="en-US" smtClean="0"/>
+              <a:rPr lang="en-US"/>
               <a:t>Fourth level</a:t>
             </a:r>
           </a:p>
           <a:p>
             <a:pPr lvl="4"/>
             <a:r>
-              <a:rPr lang="en-US" smtClean="0"/>
+              <a:rPr lang="en-US"/>
               <a:t>Fifth level</a:t>
             </a:r>
-            <a:endParaRPr lang="en-US"/>
           </a:p>
         </p:txBody>
       </p:sp>
@@ -630,7 +640,7 @@
           <a:p>
             <a:fld id="{C6E2A84D-9853-4072-BA3E-F55C1F0C3937}" type="datetimeFigureOut">
               <a:rPr lang="en-US" smtClean="0"/>
-              <a:t>1/19/2014</a:t>
+              <a:t>4/23/2023</a:t>
             </a:fld>
             <a:endParaRPr lang="en-US"/>
           </a:p>
@@ -719,10 +729,9 @@
           <a:lstStyle/>
           <a:p>
             <a:r>
-              <a:rPr lang="en-US" smtClean="0"/>
+              <a:rPr lang="en-US"/>
               <a:t>Click to edit Master title style</a:t>
             </a:r>
-            <a:endParaRPr lang="en-US"/>
           </a:p>
         </p:txBody>
       </p:sp>
@@ -743,38 +752,37 @@
           <a:p>
             <a:pPr lvl="0"/>
             <a:r>
-              <a:rPr lang="en-US" smtClean="0"/>
+              <a:rPr lang="en-US"/>
               <a:t>Click to edit Master text styles</a:t>
             </a:r>
           </a:p>
           <a:p>
             <a:pPr lvl="1"/>
             <a:r>
-              <a:rPr lang="en-US" smtClean="0"/>
+              <a:rPr lang="en-US"/>
               <a:t>Second level</a:t>
             </a:r>
           </a:p>
           <a:p>
             <a:pPr lvl="2"/>
             <a:r>
-              <a:rPr lang="en-US" smtClean="0"/>
+              <a:rPr lang="en-US"/>
               <a:t>Third level</a:t>
             </a:r>
           </a:p>
           <a:p>
             <a:pPr lvl="3"/>
             <a:r>
-              <a:rPr lang="en-US" smtClean="0"/>
+              <a:rPr lang="en-US"/>
               <a:t>Fourth level</a:t>
             </a:r>
           </a:p>
           <a:p>
             <a:pPr lvl="4"/>
             <a:r>
-              <a:rPr lang="en-US" smtClean="0"/>
+              <a:rPr lang="en-US"/>
               <a:t>Fifth level</a:t>
             </a:r>
-            <a:endParaRPr lang="en-US"/>
           </a:p>
         </p:txBody>
       </p:sp>
@@ -795,7 +803,7 @@
           <a:p>
             <a:fld id="{C6E2A84D-9853-4072-BA3E-F55C1F0C3937}" type="datetimeFigureOut">
               <a:rPr lang="en-US" smtClean="0"/>
-              <a:t>1/19/2014</a:t>
+              <a:t>4/23/2023</a:t>
             </a:fld>
             <a:endParaRPr lang="en-US"/>
           </a:p>
@@ -893,10 +901,9 @@
           </a:lstStyle>
           <a:p>
             <a:r>
-              <a:rPr lang="en-US" smtClean="0"/>
+              <a:rPr lang="en-US"/>
               <a:t>Click to edit Master title style</a:t>
             </a:r>
-            <a:endParaRPr lang="en-US"/>
           </a:p>
         </p:txBody>
       </p:sp>
@@ -1013,7 +1020,7 @@
           <a:p>
             <a:pPr lvl="0"/>
             <a:r>
-              <a:rPr lang="en-US" smtClean="0"/>
+              <a:rPr lang="en-US"/>
               <a:t>Click to edit Master text styles</a:t>
             </a:r>
           </a:p>
@@ -1036,7 +1043,7 @@
           <a:p>
             <a:fld id="{C6E2A84D-9853-4072-BA3E-F55C1F0C3937}" type="datetimeFigureOut">
               <a:rPr lang="en-US" smtClean="0"/>
-              <a:t>1/19/2014</a:t>
+              <a:t>4/23/2023</a:t>
             </a:fld>
             <a:endParaRPr lang="en-US"/>
           </a:p>
@@ -1125,10 +1132,9 @@
           <a:lstStyle/>
           <a:p>
             <a:r>
-              <a:rPr lang="en-US" smtClean="0"/>
+              <a:rPr lang="en-US"/>
               <a:t>Click to edit Master title style</a:t>
             </a:r>
-            <a:endParaRPr lang="en-US"/>
           </a:p>
         </p:txBody>
       </p:sp>
@@ -1182,38 +1188,37 @@
           <a:p>
             <a:pPr lvl="0"/>
             <a:r>
-              <a:rPr lang="en-US" smtClean="0"/>
+              <a:rPr lang="en-US"/>
               <a:t>Click to edit Master text styles</a:t>
             </a:r>
           </a:p>
           <a:p>
             <a:pPr lvl="1"/>
             <a:r>
-              <a:rPr lang="en-US" smtClean="0"/>
+              <a:rPr lang="en-US"/>
               <a:t>Second level</a:t>
             </a:r>
           </a:p>
           <a:p>
             <a:pPr lvl="2"/>
             <a:r>
-              <a:rPr lang="en-US" smtClean="0"/>
+              <a:rPr lang="en-US"/>
               <a:t>Third level</a:t>
             </a:r>
           </a:p>
           <a:p>
             <a:pPr lvl="3"/>
             <a:r>
-              <a:rPr lang="en-US" smtClean="0"/>
+              <a:rPr lang="en-US"/>
               <a:t>Fourth level</a:t>
             </a:r>
           </a:p>
           <a:p>
             <a:pPr lvl="4"/>
             <a:r>
-              <a:rPr lang="en-US" smtClean="0"/>
+              <a:rPr lang="en-US"/>
               <a:t>Fifth level</a:t>
             </a:r>
-            <a:endParaRPr lang="en-US"/>
           </a:p>
         </p:txBody>
       </p:sp>
@@ -1267,38 +1272,37 @@
           <a:p>
             <a:pPr lvl="0"/>
             <a:r>
-              <a:rPr lang="en-US" smtClean="0"/>
+              <a:rPr lang="en-US"/>
               <a:t>Click to edit Master text styles</a:t>
             </a:r>
           </a:p>
           <a:p>
             <a:pPr lvl="1"/>
             <a:r>
-              <a:rPr lang="en-US" smtClean="0"/>
+              <a:rPr lang="en-US"/>
               <a:t>Second level</a:t>
             </a:r>
           </a:p>
           <a:p>
             <a:pPr lvl="2"/>
             <a:r>
-              <a:rPr lang="en-US" smtClean="0"/>
+              <a:rPr lang="en-US"/>
               <a:t>Third level</a:t>
             </a:r>
           </a:p>
           <a:p>
             <a:pPr lvl="3"/>
             <a:r>
-              <a:rPr lang="en-US" smtClean="0"/>
+              <a:rPr lang="en-US"/>
               <a:t>Fourth level</a:t>
             </a:r>
           </a:p>
           <a:p>
             <a:pPr lvl="4"/>
             <a:r>
-              <a:rPr lang="en-US" smtClean="0"/>
+              <a:rPr lang="en-US"/>
               <a:t>Fifth level</a:t>
             </a:r>
-            <a:endParaRPr lang="en-US"/>
           </a:p>
         </p:txBody>
       </p:sp>
@@ -1319,7 +1323,7 @@
           <a:p>
             <a:fld id="{C6E2A84D-9853-4072-BA3E-F55C1F0C3937}" type="datetimeFigureOut">
               <a:rPr lang="en-US" smtClean="0"/>
-              <a:t>1/19/2014</a:t>
+              <a:t>4/23/2023</a:t>
             </a:fld>
             <a:endParaRPr lang="en-US"/>
           </a:p>
@@ -1412,10 +1416,9 @@
           </a:lstStyle>
           <a:p>
             <a:r>
-              <a:rPr lang="en-US" smtClean="0"/>
+              <a:rPr lang="en-US"/>
               <a:t>Click to edit Master title style</a:t>
             </a:r>
-            <a:endParaRPr lang="en-US"/>
           </a:p>
         </p:txBody>
       </p:sp>
@@ -1478,7 +1481,7 @@
           <a:p>
             <a:pPr lvl="0"/>
             <a:r>
-              <a:rPr lang="en-US" smtClean="0"/>
+              <a:rPr lang="en-US"/>
               <a:t>Click to edit Master text styles</a:t>
             </a:r>
           </a:p>
@@ -1534,38 +1537,37 @@
           <a:p>
             <a:pPr lvl="0"/>
             <a:r>
-              <a:rPr lang="en-US" smtClean="0"/>
+              <a:rPr lang="en-US"/>
               <a:t>Click to edit Master text styles</a:t>
             </a:r>
           </a:p>
           <a:p>
             <a:pPr lvl="1"/>
             <a:r>
-              <a:rPr lang="en-US" smtClean="0"/>
+              <a:rPr lang="en-US"/>
               <a:t>Second level</a:t>
             </a:r>
           </a:p>
           <a:p>
             <a:pPr lvl="2"/>
             <a:r>
-              <a:rPr lang="en-US" smtClean="0"/>
+              <a:rPr lang="en-US"/>
               <a:t>Third level</a:t>
             </a:r>
           </a:p>
           <a:p>
             <a:pPr lvl="3"/>
             <a:r>
-              <a:rPr lang="en-US" smtClean="0"/>
+              <a:rPr lang="en-US"/>
               <a:t>Fourth level</a:t>
             </a:r>
           </a:p>
           <a:p>
             <a:pPr lvl="4"/>
             <a:r>
-              <a:rPr lang="en-US" smtClean="0"/>
+              <a:rPr lang="en-US"/>
               <a:t>Fifth level</a:t>
             </a:r>
-            <a:endParaRPr lang="en-US"/>
           </a:p>
         </p:txBody>
       </p:sp>
@@ -1628,7 +1630,7 @@
           <a:p>
             <a:pPr lvl="0"/>
             <a:r>
-              <a:rPr lang="en-US" smtClean="0"/>
+              <a:rPr lang="en-US"/>
               <a:t>Click to edit Master text styles</a:t>
             </a:r>
           </a:p>
@@ -1684,38 +1686,37 @@
           <a:p>
             <a:pPr lvl="0"/>
             <a:r>
-              <a:rPr lang="en-US" smtClean="0"/>
+              <a:rPr lang="en-US"/>
               <a:t>Click to edit Master text styles</a:t>
             </a:r>
           </a:p>
           <a:p>
             <a:pPr lvl="1"/>
             <a:r>
-              <a:rPr lang="en-US" smtClean="0"/>
+              <a:rPr lang="en-US"/>
               <a:t>Second level</a:t>
             </a:r>
           </a:p>
           <a:p>
             <a:pPr lvl="2"/>
             <a:r>
-              <a:rPr lang="en-US" smtClean="0"/>
+              <a:rPr lang="en-US"/>
               <a:t>Third level</a:t>
             </a:r>
           </a:p>
           <a:p>
             <a:pPr lvl="3"/>
             <a:r>
-              <a:rPr lang="en-US" smtClean="0"/>
+              <a:rPr lang="en-US"/>
               <a:t>Fourth level</a:t>
             </a:r>
           </a:p>
           <a:p>
             <a:pPr lvl="4"/>
             <a:r>
-              <a:rPr lang="en-US" smtClean="0"/>
+              <a:rPr lang="en-US"/>
               <a:t>Fifth level</a:t>
             </a:r>
-            <a:endParaRPr lang="en-US"/>
           </a:p>
         </p:txBody>
       </p:sp>
@@ -1736,7 +1737,7 @@
           <a:p>
             <a:fld id="{C6E2A84D-9853-4072-BA3E-F55C1F0C3937}" type="datetimeFigureOut">
               <a:rPr lang="en-US" smtClean="0"/>
-              <a:t>1/19/2014</a:t>
+              <a:t>4/23/2023</a:t>
             </a:fld>
             <a:endParaRPr lang="en-US"/>
           </a:p>
@@ -1825,10 +1826,9 @@
           <a:lstStyle/>
           <a:p>
             <a:r>
-              <a:rPr lang="en-US" smtClean="0"/>
+              <a:rPr lang="en-US"/>
               <a:t>Click to edit Master title style</a:t>
             </a:r>
-            <a:endParaRPr lang="en-US"/>
           </a:p>
         </p:txBody>
       </p:sp>
@@ -1849,7 +1849,7 @@
           <a:p>
             <a:fld id="{C6E2A84D-9853-4072-BA3E-F55C1F0C3937}" type="datetimeFigureOut">
               <a:rPr lang="en-US" smtClean="0"/>
-              <a:t>1/19/2014</a:t>
+              <a:t>4/23/2023</a:t>
             </a:fld>
             <a:endParaRPr lang="en-US"/>
           </a:p>
@@ -1939,7 +1939,7 @@
           <a:p>
             <a:fld id="{C6E2A84D-9853-4072-BA3E-F55C1F0C3937}" type="datetimeFigureOut">
               <a:rPr lang="en-US" smtClean="0"/>
-              <a:t>1/19/2014</a:t>
+              <a:t>4/23/2023</a:t>
             </a:fld>
             <a:endParaRPr lang="en-US"/>
           </a:p>
@@ -2037,10 +2037,9 @@
           </a:lstStyle>
           <a:p>
             <a:r>
-              <a:rPr lang="en-US" smtClean="0"/>
+              <a:rPr lang="en-US"/>
               <a:t>Click to edit Master title style</a:t>
             </a:r>
-            <a:endParaRPr lang="en-US"/>
           </a:p>
         </p:txBody>
       </p:sp>
@@ -2094,38 +2093,37 @@
           <a:p>
             <a:pPr lvl="0"/>
             <a:r>
-              <a:rPr lang="en-US" smtClean="0"/>
+              <a:rPr lang="en-US"/>
               <a:t>Click to edit Master text styles</a:t>
             </a:r>
           </a:p>
           <a:p>
             <a:pPr lvl="1"/>
             <a:r>
-              <a:rPr lang="en-US" smtClean="0"/>
+              <a:rPr lang="en-US"/>
               <a:t>Second level</a:t>
             </a:r>
           </a:p>
           <a:p>
             <a:pPr lvl="2"/>
             <a:r>
-              <a:rPr lang="en-US" smtClean="0"/>
+              <a:rPr lang="en-US"/>
               <a:t>Third level</a:t>
             </a:r>
           </a:p>
           <a:p>
             <a:pPr lvl="3"/>
             <a:r>
-              <a:rPr lang="en-US" smtClean="0"/>
+              <a:rPr lang="en-US"/>
               <a:t>Fourth level</a:t>
             </a:r>
           </a:p>
           <a:p>
             <a:pPr lvl="4"/>
             <a:r>
-              <a:rPr lang="en-US" smtClean="0"/>
+              <a:rPr lang="en-US"/>
               <a:t>Fifth level</a:t>
             </a:r>
-            <a:endParaRPr lang="en-US"/>
           </a:p>
         </p:txBody>
       </p:sp>
@@ -2188,7 +2186,7 @@
           <a:p>
             <a:pPr lvl="0"/>
             <a:r>
-              <a:rPr lang="en-US" smtClean="0"/>
+              <a:rPr lang="en-US"/>
               <a:t>Click to edit Master text styles</a:t>
             </a:r>
           </a:p>
@@ -2211,7 +2209,7 @@
           <a:p>
             <a:fld id="{C6E2A84D-9853-4072-BA3E-F55C1F0C3937}" type="datetimeFigureOut">
               <a:rPr lang="en-US" smtClean="0"/>
-              <a:t>1/19/2014</a:t>
+              <a:t>4/23/2023</a:t>
             </a:fld>
             <a:endParaRPr lang="en-US"/>
           </a:p>
@@ -2309,10 +2307,9 @@
           </a:lstStyle>
           <a:p>
             <a:r>
-              <a:rPr lang="en-US" smtClean="0"/>
+              <a:rPr lang="en-US"/>
               <a:t>Click to edit Master title style</a:t>
             </a:r>
-            <a:endParaRPr lang="en-US"/>
           </a:p>
         </p:txBody>
       </p:sp>
@@ -2436,7 +2433,7 @@
           <a:p>
             <a:pPr lvl="0"/>
             <a:r>
-              <a:rPr lang="en-US" smtClean="0"/>
+              <a:rPr lang="en-US"/>
               <a:t>Click to edit Master text styles</a:t>
             </a:r>
           </a:p>
@@ -2459,7 +2456,7 @@
           <a:p>
             <a:fld id="{C6E2A84D-9853-4072-BA3E-F55C1F0C3937}" type="datetimeFigureOut">
               <a:rPr lang="en-US" smtClean="0"/>
-              <a:t>1/19/2014</a:t>
+              <a:t>4/23/2023</a:t>
             </a:fld>
             <a:endParaRPr lang="en-US"/>
           </a:p>
@@ -2563,10 +2560,9 @@
           <a:lstStyle/>
           <a:p>
             <a:r>
-              <a:rPr lang="en-US" smtClean="0"/>
+              <a:rPr lang="en-US"/>
               <a:t>Click to edit Master title style</a:t>
             </a:r>
-            <a:endParaRPr lang="en-US"/>
           </a:p>
         </p:txBody>
       </p:sp>
@@ -2597,38 +2593,37 @@
           <a:p>
             <a:pPr lvl="0"/>
             <a:r>
-              <a:rPr lang="en-US" smtClean="0"/>
+              <a:rPr lang="en-US"/>
               <a:t>Click to edit Master text styles</a:t>
             </a:r>
           </a:p>
           <a:p>
             <a:pPr lvl="1"/>
             <a:r>
-              <a:rPr lang="en-US" smtClean="0"/>
+              <a:rPr lang="en-US"/>
               <a:t>Second level</a:t>
             </a:r>
           </a:p>
           <a:p>
             <a:pPr lvl="2"/>
             <a:r>
-              <a:rPr lang="en-US" smtClean="0"/>
+              <a:rPr lang="en-US"/>
               <a:t>Third level</a:t>
             </a:r>
           </a:p>
           <a:p>
             <a:pPr lvl="3"/>
             <a:r>
-              <a:rPr lang="en-US" smtClean="0"/>
+              <a:rPr lang="en-US"/>
               <a:t>Fourth level</a:t>
             </a:r>
           </a:p>
           <a:p>
             <a:pPr lvl="4"/>
             <a:r>
-              <a:rPr lang="en-US" smtClean="0"/>
+              <a:rPr lang="en-US"/>
               <a:t>Fifth level</a:t>
             </a:r>
-            <a:endParaRPr lang="en-US"/>
           </a:p>
         </p:txBody>
       </p:sp>
@@ -2667,7 +2662,7 @@
           <a:p>
             <a:fld id="{C6E2A84D-9853-4072-BA3E-F55C1F0C3937}" type="datetimeFigureOut">
               <a:rPr lang="en-US" smtClean="0"/>
-              <a:t>1/19/2014</a:t>
+              <a:t>4/23/2023</a:t>
             </a:fld>
             <a:endParaRPr lang="en-US"/>
           </a:p>
@@ -3055,30 +3050,30 @@
           <a:lstStyle/>
           <a:p>
             <a:r>
-              <a:rPr lang="en-US" altLang="zh-TW" dirty="0" smtClean="0"/>
+              <a:rPr lang="en-US" altLang="zh-TW" dirty="0"/>
               <a:t>【</a:t>
             </a:r>
             <a:r>
-              <a:rPr lang="zh-TW" altLang="en-US" dirty="0" smtClean="0"/>
+              <a:rPr lang="zh-TW" altLang="en-US" dirty="0"/>
               <a:t>惟獨耶穌</a:t>
             </a:r>
             <a:r>
-              <a:rPr lang="en-US" altLang="zh-TW" dirty="0" smtClean="0"/>
+              <a:rPr lang="en-US" altLang="zh-TW" dirty="0"/>
               <a:t>】</a:t>
             </a:r>
             <a:br>
-              <a:rPr lang="en-US" altLang="zh-TW" dirty="0" smtClean="0"/>
+              <a:rPr lang="en-US" altLang="zh-TW" dirty="0"/>
             </a:br>
             <a:r>
-              <a:rPr lang="zh-TW" altLang="en-US" sz="2200" dirty="0" smtClean="0"/>
+              <a:rPr lang="zh-TW" altLang="en-US" sz="2200" dirty="0"/>
               <a:t>生命聖詩，</a:t>
             </a:r>
             <a:r>
-              <a:rPr lang="en-US" altLang="zh-TW" sz="2200" dirty="0" smtClean="0"/>
+              <a:rPr lang="en-US" altLang="zh-TW" sz="2200" dirty="0"/>
               <a:t>86</a:t>
             </a:r>
             <a:br>
-              <a:rPr lang="en-US" altLang="zh-TW" sz="2200" dirty="0" smtClean="0"/>
+              <a:rPr lang="en-US" altLang="zh-TW" sz="2200" dirty="0"/>
             </a:br>
             <a:endParaRPr lang="en-US" sz="2200" dirty="0"/>
           </a:p>
@@ -3110,21 +3105,21 @@
               <a:buNone/>
             </a:pPr>
             <a:r>
-              <a:rPr lang="en-US" altLang="zh-TW" b="1" dirty="0" smtClean="0"/>
+              <a:rPr lang="en-US" altLang="zh-TW" b="1" dirty="0"/>
               <a:t>1  </a:t>
             </a:r>
             <a:r>
-              <a:rPr lang="zh-TW" altLang="en-US" b="1" dirty="0" smtClean="0"/>
+              <a:rPr lang="zh-TW" altLang="en-US" b="1" dirty="0"/>
               <a:t>惟獨耶穌是我信息，惟獨耶穌我所傳揚；</a:t>
             </a:r>
             <a:br>
-              <a:rPr lang="zh-TW" altLang="en-US" b="1" dirty="0" smtClean="0"/>
+              <a:rPr lang="zh-TW" altLang="en-US" b="1" dirty="0"/>
             </a:br>
             <a:r>
-              <a:rPr lang="zh-TW" altLang="en-US" b="1" dirty="0" smtClean="0"/>
+              <a:rPr lang="zh-TW" altLang="en-US" b="1" dirty="0"/>
               <a:t>我要永遠高舉耶穌，惟獨耶穌我所仰望。</a:t>
             </a:r>
-            <a:endParaRPr lang="en-US" altLang="zh-TW" b="1" dirty="0" smtClean="0"/>
+            <a:endParaRPr lang="en-US" altLang="zh-TW" b="1" dirty="0"/>
           </a:p>
           <a:p>
             <a:pPr algn="ctr">
@@ -3137,17 +3132,17 @@
               <a:buAutoNum type="arabicPlain" startAt="2"/>
             </a:pPr>
             <a:r>
-              <a:rPr lang="zh-TW" altLang="en-US" b="1" dirty="0" smtClean="0"/>
+              <a:rPr lang="zh-TW" altLang="en-US" b="1" dirty="0"/>
               <a:t>惟獨耶穌是我救主，我眾罪過祂代擔當；</a:t>
             </a:r>
             <a:br>
-              <a:rPr lang="zh-TW" altLang="en-US" b="1" dirty="0" smtClean="0"/>
+              <a:rPr lang="zh-TW" altLang="en-US" b="1" dirty="0"/>
             </a:br>
             <a:r>
-              <a:rPr lang="zh-TW" altLang="en-US" b="1" dirty="0" smtClean="0"/>
+              <a:rPr lang="zh-TW" altLang="en-US" b="1" dirty="0"/>
               <a:t>惟獨耶穌使我稱義，日日賜我所需力量。</a:t>
             </a:r>
-            <a:endParaRPr lang="en-US" altLang="zh-TW" b="1" dirty="0" smtClean="0"/>
+            <a:endParaRPr lang="en-US" altLang="zh-TW" b="1" dirty="0"/>
           </a:p>
           <a:p>
             <a:pPr marL="514350" indent="-514350" algn="ctr">
@@ -3160,23 +3155,23 @@
               <a:buNone/>
             </a:pPr>
             <a:r>
-              <a:rPr lang="zh-TW" altLang="en-US" b="1" dirty="0" smtClean="0"/>
+              <a:rPr lang="zh-TW" altLang="en-US" b="1" dirty="0"/>
               <a:t>副歌：惟獨耶穌，永遠耶穌，我心讚譽，我口傳揚，</a:t>
             </a:r>
-            <a:endParaRPr lang="en-US" altLang="zh-TW" b="1" dirty="0" smtClean="0"/>
+            <a:endParaRPr lang="en-US" altLang="zh-TW" b="1" dirty="0"/>
           </a:p>
           <a:p>
             <a:pPr marL="514350" indent="-514350" algn="ctr">
               <a:buNone/>
             </a:pPr>
             <a:r>
-              <a:rPr lang="zh-TW" altLang="en-US" b="1" dirty="0" smtClean="0"/>
+              <a:rPr lang="zh-TW" altLang="en-US" b="1" dirty="0"/>
               <a:t>            救我醫我，使我成聖，榮耀救主，再來之王。 </a:t>
             </a:r>
             <a:br>
-              <a:rPr lang="zh-TW" altLang="en-US" b="1" dirty="0" smtClean="0"/>
+              <a:rPr lang="zh-TW" altLang="en-US" b="1" dirty="0"/>
             </a:br>
-            <a:endParaRPr lang="en-US" altLang="zh-TW" b="1" dirty="0" smtClean="0"/>
+            <a:endParaRPr lang="en-US" altLang="zh-TW" b="1" dirty="0"/>
           </a:p>
           <a:p>
             <a:pPr>
@@ -3256,18 +3251,40 @@
               <a:buAutoNum type="arabicPlain" startAt="3"/>
             </a:pPr>
             <a:r>
-              <a:rPr lang="zh-TW" altLang="en-US" b="1" dirty="0" smtClean="0"/>
-              <a:t>惟獨耶穌使我成聖，脫離自我，罪洗清，</a:t>
+              <a:rPr lang="zh-TW" altLang="en-US" b="1" dirty="0"/>
+              <a:t>惟獨耶穌使我成聖，脫離自我</a:t>
+            </a:r>
+            <a:r>
+              <a:rPr lang="zh-TW" altLang="en-US" b="1"/>
+              <a:t>，罪</a:t>
+            </a:r>
+            <a:r>
+              <a:rPr lang="zh-TW" altLang="en-US" b="0" i="0">
+                <a:solidFill>
+                  <a:srgbClr val="000000"/>
+                </a:solidFill>
+                <a:effectLst/>
+                <a:latin typeface="Times New Roman" panose="02020603050405020304" pitchFamily="18" charset="0"/>
+              </a:rPr>
+              <a:t>汚</a:t>
+            </a:r>
+            <a:r>
+              <a:rPr lang="zh-TW" altLang="en-US" b="1"/>
+              <a:t>洗</a:t>
+            </a:r>
+            <a:r>
+              <a:rPr lang="zh-TW" altLang="en-US" b="1" dirty="0"/>
+              <a:t>清，</a:t>
             </a:r>
             <a:br>
-              <a:rPr lang="zh-TW" altLang="en-US" b="1" dirty="0" smtClean="0"/>
+              <a:rPr lang="zh-TW" altLang="en-US" b="1" dirty="0"/>
             </a:br>
             <a:r>
-              <a:rPr lang="zh-TW" altLang="en-US" b="1" dirty="0" smtClean="0"/>
+              <a:rPr lang="zh-TW" altLang="en-US" b="1" dirty="0"/>
               <a:t>惟獨耶穌賜下聖靈，充滿我心，靈命豐盛。</a:t>
             </a:r>
             <a:br>
-              <a:rPr lang="zh-TW" altLang="en-US" b="1" dirty="0" smtClean="0"/>
+              <a:rPr lang="zh-TW" altLang="en-US" b="1" dirty="0"/>
             </a:br>
             <a:endParaRPr lang="en-US" altLang="zh-TW" b="1" dirty="0"/>
           </a:p>
@@ -3276,54 +3293,50 @@
               <a:buAutoNum type="arabicPlain" startAt="4"/>
             </a:pPr>
             <a:r>
-              <a:rPr lang="zh-TW" altLang="en-US" b="1" dirty="0" smtClean="0"/>
+              <a:rPr lang="zh-TW" altLang="en-US" b="1" dirty="0"/>
               <a:t>惟獨耶穌醫我疾病，一切軟弱主代擔當，</a:t>
             </a:r>
             <a:br>
-              <a:rPr lang="zh-TW" altLang="en-US" b="1" dirty="0" smtClean="0"/>
+              <a:rPr lang="zh-TW" altLang="en-US" b="1" dirty="0"/>
             </a:br>
             <a:r>
-              <a:rPr lang="zh-TW" altLang="en-US" b="1" dirty="0" smtClean="0"/>
+              <a:rPr lang="zh-TW" altLang="en-US" b="1" dirty="0"/>
               <a:t>祂的復活豐盛生命，祂的肢體皆能分享。</a:t>
             </a:r>
-            <a:endParaRPr lang="en-US" altLang="zh-TW" b="1" dirty="0" smtClean="0"/>
+            <a:endParaRPr lang="en-US" altLang="zh-TW" b="1" dirty="0"/>
           </a:p>
           <a:p>
             <a:pPr marL="514350" indent="-514350" algn="ctr">
               <a:buAutoNum type="arabicPlain" startAt="4"/>
             </a:pPr>
-            <a:endParaRPr lang="en-US" altLang="zh-TW" b="1" dirty="0" smtClean="0"/>
+            <a:endParaRPr lang="en-US" altLang="zh-TW" b="1" dirty="0"/>
           </a:p>
           <a:p>
             <a:pPr marL="514350" indent="-514350" algn="ctr">
               <a:buNone/>
             </a:pPr>
             <a:r>
-              <a:rPr lang="zh-TW" altLang="en-US" b="1" dirty="0" smtClean="0"/>
+              <a:rPr lang="zh-TW" altLang="en-US" b="1" dirty="0"/>
               <a:t>副歌：惟獨耶穌，永遠耶穌，我心讚譽，我口傳揚，</a:t>
             </a:r>
             <a:br>
-              <a:rPr lang="zh-TW" altLang="en-US" b="1" dirty="0" smtClean="0"/>
+              <a:rPr lang="zh-TW" altLang="en-US" b="1" dirty="0"/>
             </a:br>
             <a:r>
-              <a:rPr lang="zh-TW" altLang="en-US" b="1" dirty="0" smtClean="0"/>
+              <a:rPr lang="zh-TW" altLang="en-US" b="1" dirty="0"/>
               <a:t>　　救我醫我，使我成聖，榮耀救主，再來之王。</a:t>
             </a:r>
             <a:br>
-              <a:rPr lang="zh-TW" altLang="en-US" b="1" dirty="0" smtClean="0"/>
+              <a:rPr lang="zh-TW" altLang="en-US" b="1" dirty="0"/>
             </a:br>
-            <a:endParaRPr lang="zh-TW" altLang="en-US" b="1" dirty="0" smtClean="0"/>
+            <a:endParaRPr lang="zh-TW" altLang="en-US" b="1" dirty="0"/>
           </a:p>
           <a:p>
             <a:pPr marL="514350" indent="-514350">
               <a:buNone/>
             </a:pPr>
-            <a:r>
-              <a:rPr lang="zh-TW" altLang="en-US" dirty="0" smtClean="0"/>
-              <a:t/>
-            </a:r>
             <a:br>
-              <a:rPr lang="zh-TW" altLang="en-US" dirty="0" smtClean="0"/>
+              <a:rPr lang="zh-TW" altLang="en-US" dirty="0"/>
             </a:br>
             <a:endParaRPr lang="en-US" dirty="0"/>
           </a:p>
@@ -3398,65 +3411,57 @@
             <a:pPr>
               <a:buNone/>
             </a:pPr>
-            <a:r>
-              <a:rPr lang="zh-TW" altLang="en-US" dirty="0" smtClean="0"/>
-              <a:t/>
-            </a:r>
             <a:br>
-              <a:rPr lang="zh-TW" altLang="en-US" dirty="0" smtClean="0"/>
+              <a:rPr lang="zh-TW" altLang="en-US" dirty="0"/>
             </a:br>
-            <a:r>
-              <a:rPr lang="zh-TW" altLang="en-US" dirty="0" smtClean="0"/>
-              <a:t/>
-            </a:r>
             <a:br>
-              <a:rPr lang="zh-TW" altLang="en-US" dirty="0" smtClean="0"/>
+              <a:rPr lang="zh-TW" altLang="en-US" dirty="0"/>
             </a:br>
-            <a:endParaRPr lang="zh-TW" altLang="en-US" dirty="0" smtClean="0"/>
+            <a:endParaRPr lang="zh-TW" altLang="en-US" dirty="0"/>
           </a:p>
           <a:p>
             <a:pPr algn="ctr">
               <a:buNone/>
             </a:pPr>
             <a:r>
-              <a:rPr lang="en-US" altLang="zh-TW" b="1" dirty="0" smtClean="0"/>
+              <a:rPr lang="en-US" altLang="zh-TW" b="1" dirty="0"/>
               <a:t>5  </a:t>
             </a:r>
             <a:r>
-              <a:rPr lang="zh-TW" altLang="en-US" b="1" dirty="0" smtClean="0"/>
+              <a:rPr lang="zh-TW" altLang="en-US" b="1" dirty="0"/>
               <a:t>惟獨耶穌我所等候，儆醒注意再來呼聲，</a:t>
             </a:r>
             <a:br>
-              <a:rPr lang="zh-TW" altLang="en-US" b="1" dirty="0" smtClean="0"/>
+              <a:rPr lang="zh-TW" altLang="en-US" b="1" dirty="0"/>
             </a:br>
             <a:r>
-              <a:rPr lang="zh-TW" altLang="en-US" b="1" dirty="0" smtClean="0"/>
+              <a:rPr lang="zh-TW" altLang="en-US" b="1" dirty="0"/>
               <a:t>仍是耶穌，只有耶穌，耶穌永是我的一切。</a:t>
             </a:r>
             <a:br>
-              <a:rPr lang="zh-TW" altLang="en-US" b="1" dirty="0" smtClean="0"/>
+              <a:rPr lang="zh-TW" altLang="en-US" b="1" dirty="0"/>
             </a:br>
-            <a:endParaRPr lang="zh-TW" altLang="en-US" b="1" dirty="0" smtClean="0"/>
+            <a:endParaRPr lang="zh-TW" altLang="en-US" b="1" dirty="0"/>
           </a:p>
           <a:p>
             <a:pPr algn="ctr">
               <a:buNone/>
             </a:pPr>
             <a:r>
-              <a:rPr lang="zh-TW" altLang="en-US" b="1" dirty="0" smtClean="0"/>
+              <a:rPr lang="zh-TW" altLang="en-US" b="1" dirty="0"/>
               <a:t>副歌：惟獨耶穌，永遠耶穌，我心讚譽，我口傳揚，</a:t>
             </a:r>
             <a:br>
-              <a:rPr lang="zh-TW" altLang="en-US" b="1" dirty="0" smtClean="0"/>
+              <a:rPr lang="zh-TW" altLang="en-US" b="1" dirty="0"/>
             </a:br>
             <a:r>
-              <a:rPr lang="zh-TW" altLang="en-US" b="1" dirty="0" smtClean="0"/>
+              <a:rPr lang="zh-TW" altLang="en-US" b="1" dirty="0"/>
               <a:t>　　救我醫我，使我成聖，榮耀救主，再來之王。</a:t>
             </a:r>
             <a:br>
-              <a:rPr lang="zh-TW" altLang="en-US" b="1" dirty="0" smtClean="0"/>
+              <a:rPr lang="zh-TW" altLang="en-US" b="1" dirty="0"/>
             </a:br>
-            <a:endParaRPr lang="zh-TW" altLang="en-US" b="1" dirty="0" smtClean="0"/>
+            <a:endParaRPr lang="zh-TW" altLang="en-US" b="1" dirty="0"/>
           </a:p>
           <a:p>
             <a:pPr>

</xml_diff>